<commit_message>
added presentation (reverted from commit fc4f7a6dff4ff7bf8ccd36458ff5ad35e7790739)
</commit_message>
<xml_diff>
--- a/Präsentationen/Presentation.pptx
+++ b/Präsentationen/Presentation.pptx
@@ -1,6 +1,6 @@
 
 <file path=ppt/presentation.xml><?xml version="1.0" encoding="utf-8"?>
-<p:presentation xmlns:a="http://schemas.openxmlformats.org/drawingml/2006/main" xmlns:r="http://schemas.openxmlformats.org/officeDocument/2006/relationships" xmlns:p="http://schemas.openxmlformats.org/presentationml/2006/main" saveSubsetFonts="1">
+<p:presentation xmlns:a="http://schemas.openxmlformats.org/drawingml/2006/main" xmlns:r="http://schemas.openxmlformats.org/officeDocument/2006/relationships" xmlns:p="http://schemas.openxmlformats.org/presentationml/2006/main">
   <p:sldMasterIdLst>
     <p:sldMasterId id="2147483648" r:id="rId1"/>
   </p:sldMasterIdLst>
@@ -204,7 +204,7 @@
           <a:p>
             <a:fld id="{2C5E210A-AF78-4FC9-820B-626AA2FBE889}" type="datetimeFigureOut">
               <a:rPr lang="de-AT" smtClean="0"/>
-              <a:t>01.02.16</a:t>
+              <a:t>09.04.2015</a:t>
             </a:fld>
             <a:endParaRPr lang="de-AT" dirty="0"/>
           </a:p>
@@ -270,7 +270,7 @@
           <a:p>
             <a:fld id="{7904DCEF-F8AE-486B-B1DF-6FA2E85E6328}" type="slidenum">
               <a:rPr lang="de-AT" smtClean="0"/>
-              <a:t>‹Nr.›</a:t>
+              <a:t>‹#›</a:t>
             </a:fld>
             <a:endParaRPr lang="de-AT" dirty="0"/>
           </a:p>
@@ -4454,7 +4454,7 @@
           </a:ln>
           <a:extLst>
             <a:ext uri="{C572A759-6A51-4108-AA02-DFA0A04FC94B}">
-              <ma14:wrappingTextBoxFlag xmlns:ma14="http://schemas.microsoft.com/office/mac/drawingml/2011/main" val="1"/>
+              <ma14:wrappingTextBoxFlag xmlns="" xmlns:ma14="http://schemas.microsoft.com/office/mac/drawingml/2011/main" val="1"/>
             </a:ext>
           </a:extLst>
         </p:spPr>
@@ -4497,7 +4497,7 @@
           </a:ln>
           <a:extLst>
             <a:ext uri="{C572A759-6A51-4108-AA02-DFA0A04FC94B}">
-              <ma14:wrappingTextBoxFlag xmlns:ma14="http://schemas.microsoft.com/office/mac/drawingml/2011/main" val="1"/>
+              <ma14:wrappingTextBoxFlag xmlns="" xmlns:ma14="http://schemas.microsoft.com/office/mac/drawingml/2011/main" val="1"/>
             </a:ext>
           </a:extLst>
         </p:spPr>
@@ -6728,7 +6728,11 @@
             </a:pPr>
             <a:r>
               <a:rPr lang="de-AT" sz="3200" dirty="0" smtClean="0"/>
-              <a:t>Wenig Augenmerk auf Vertrieb, CRM und Wartung</a:t>
+              <a:t>Wenig Augenmerk auf Vertrieb, CRM und </a:t>
+            </a:r>
+            <a:r>
+              <a:rPr lang="de-AT" sz="3200" dirty="0" smtClean="0"/>
+              <a:t>Wartung</a:t>
             </a:r>
           </a:p>
           <a:p>
@@ -6759,6 +6763,7 @@
               <a:rPr lang="de-AT" sz="3200" dirty="0" smtClean="0"/>
               <a:t> Unternehmen</a:t>
             </a:r>
+            <a:endParaRPr lang="de-AT" sz="3200" dirty="0" smtClean="0"/>
           </a:p>
           <a:p>
             <a:pPr lvl="0">
@@ -7898,8 +7903,8 @@
               <a:t>1960 </a:t>
             </a:r>
             <a:r>
-              <a:rPr lang="de-AT" sz="3200" dirty="0" smtClean="0"/>
-              <a:t>Aktiengesellschaft</a:t>
+              <a:rPr lang="de-AT" sz="3200" dirty="0" err="1"/>
+              <a:t>Aktiongesellschaft</a:t>
             </a:r>
             <a:endParaRPr lang="de-AT" sz="3200" dirty="0"/>
           </a:p>
@@ -8092,28 +8097,8 @@
             </a:pPr>
             <a:r>
               <a:rPr lang="de-AT" sz="3200" dirty="0"/>
-              <a:t>2014: 10,14 Mio. verkaufte </a:t>
-            </a:r>
-            <a:r>
-              <a:rPr lang="de-AT" sz="3200" dirty="0" smtClean="0"/>
-              <a:t>Fahrzeuge</a:t>
-            </a:r>
-          </a:p>
-          <a:p>
-            <a:pPr lvl="0">
-              <a:lnSpc>
-                <a:spcPct val="250000"/>
-              </a:lnSpc>
-              <a:spcBef>
-                <a:spcPts val="1800"/>
-              </a:spcBef>
-              <a:defRPr sz="1800"/>
-            </a:pPr>
-            <a:r>
-              <a:rPr lang="de-AT" sz="3200" dirty="0" smtClean="0"/>
-              <a:t>2015: Abgasskandal</a:t>
-            </a:r>
-            <a:endParaRPr lang="de-AT" sz="3200" dirty="0"/>
+              <a:t>2014: 10,14 Mio. verkaufte Fahrzeuge</a:t>
+            </a:r>
           </a:p>
         </p:txBody>
       </p:sp>
@@ -8698,6 +8683,7 @@
               <a:rPr lang="de-DE" altLang="de-DE" sz="3200" dirty="0" smtClean="0"/>
               <a:t>Niedersachsen</a:t>
             </a:r>
+            <a:endParaRPr lang="de-DE" altLang="de-DE" sz="3200" dirty="0" smtClean="0"/>
           </a:p>
           <a:p>
             <a:pPr marL="0" marR="0" lvl="0" indent="0" algn="l" defTabSz="914400" rtl="0" eaLnBrk="0" fontAlgn="base" latinLnBrk="0" hangingPunct="0">
@@ -8737,7 +8723,11 @@
             </a:pPr>
             <a:r>
               <a:rPr lang="de-DE" altLang="de-DE" sz="3200" dirty="0" smtClean="0"/>
-              <a:t>17,00% </a:t>
+              <a:t>17,00</a:t>
+            </a:r>
+            <a:r>
+              <a:rPr lang="de-DE" altLang="de-DE" sz="3200" dirty="0" smtClean="0"/>
+              <a:t>% </a:t>
             </a:r>
             <a:r>
               <a:rPr lang="de-DE" altLang="de-DE" sz="3200" dirty="0" err="1"/>
@@ -8790,7 +8780,11 @@
             </a:pPr>
             <a:r>
               <a:rPr lang="de-DE" altLang="de-DE" sz="3200" dirty="0" smtClean="0"/>
-              <a:t>12,30% </a:t>
+              <a:t>12,30</a:t>
+            </a:r>
+            <a:r>
+              <a:rPr lang="de-DE" altLang="de-DE" sz="3200" dirty="0" smtClean="0"/>
+              <a:t>% </a:t>
             </a:r>
             <a:r>
               <a:rPr lang="de-DE" altLang="de-DE" sz="3200" dirty="0"/>

</xml_diff>